<commit_message>
Final upload for week 1
Finally!!!!
</commit_message>
<xml_diff>
--- a/Lecture/Week_1/Repoert_Week_1.pptx
+++ b/Lecture/Week_1/Repoert_Week_1.pptx
@@ -8924,7 +8924,7 @@
     <mc:Choice Requires="p14">
       <p:transition/>
     </mc:Choice>
-    <mc:Fallback xmlns="" xmlns:c="http://schemas.openxmlformats.org/drawingml/2006/chart" xmlns:dgm="http://schemas.openxmlformats.org/drawingml/2006/diagram" xmlns:dsp="http://schemas.microsoft.com/office/drawing/2008/diagram">
+    <mc:Fallback xmlns:dsp="http://schemas.microsoft.com/office/drawing/2008/diagram" xmlns:dgm="http://schemas.openxmlformats.org/drawingml/2006/diagram" xmlns:c="http://schemas.openxmlformats.org/drawingml/2006/chart" xmlns="">
       <p:transition/>
     </mc:Fallback>
   </mc:AlternateContent>
@@ -10436,7 +10436,7 @@
     <mc:Choice Requires="p14">
       <p:transition/>
     </mc:Choice>
-    <mc:Fallback xmlns="" xmlns:c="http://schemas.openxmlformats.org/drawingml/2006/chart" xmlns:dgm="http://schemas.openxmlformats.org/drawingml/2006/diagram" xmlns:dsp="http://schemas.microsoft.com/office/drawing/2008/diagram">
+    <mc:Fallback xmlns:dsp="http://schemas.microsoft.com/office/drawing/2008/diagram" xmlns:dgm="http://schemas.openxmlformats.org/drawingml/2006/diagram" xmlns:c="http://schemas.openxmlformats.org/drawingml/2006/chart" xmlns="">
       <p:transition/>
     </mc:Fallback>
   </mc:AlternateContent>
@@ -10503,8 +10503,8 @@
           </a:p>
         </p:txBody>
       </p:sp>
-      <mc:AlternateContent xmlns:mc="http://schemas.openxmlformats.org/markup-compatibility/2006">
-        <mc:Choice xmlns:a14="http://schemas.microsoft.com/office/drawing/2010/main" Requires="a14">
+      <mc:AlternateContent xmlns:mc="http://schemas.openxmlformats.org/markup-compatibility/2006" xmlns:a14="http://schemas.microsoft.com/office/drawing/2010/main">
+        <mc:Choice Requires="a14">
           <p:sp>
             <p:nvSpPr>
               <p:cNvPr id="16" name="TextBox 15">
@@ -10554,18 +10554,24 @@
                     <m:sSub>
                       <m:sSubPr>
                         <m:ctrlPr>
-                          <a:rPr lang="ko-KR" altLang="ko-KR" i="1"/>
+                          <a:rPr lang="ko-KR" altLang="ko-KR" i="1">
+                            <a:latin typeface="Cambria Math" panose="02040503050406030204" pitchFamily="18" charset="0"/>
+                          </a:rPr>
                         </m:ctrlPr>
                       </m:sSubPr>
                       <m:e>
                         <m:r>
-                          <a:rPr lang="en-US" altLang="ko-KR" i="1"/>
+                          <a:rPr lang="en-US" altLang="ko-KR" i="1">
+                            <a:latin typeface="Cambria Math" panose="02040503050406030204" pitchFamily="18" charset="0"/>
+                          </a:rPr>
                           <m:t>𝐶</m:t>
                         </m:r>
                       </m:e>
                       <m:sub>
                         <m:r>
-                          <a:rPr lang="en-US" altLang="ko-KR" i="1"/>
+                          <a:rPr lang="en-US" altLang="ko-KR" i="1">
+                            <a:latin typeface="Cambria Math" panose="02040503050406030204" pitchFamily="18" charset="0"/>
+                          </a:rPr>
                           <m:t>𝑝</m:t>
                         </m:r>
                       </m:sub>
@@ -10581,7 +10587,7 @@
             </p:txBody>
           </p:sp>
         </mc:Choice>
-        <mc:Fallback>
+        <mc:Fallback xmlns="">
           <p:sp>
             <p:nvSpPr>
               <p:cNvPr id="16" name="TextBox 15">
@@ -10722,8 +10728,8 @@
           </p:txBody>
         </p:sp>
       </p:grpSp>
-      <mc:AlternateContent xmlns:mc="http://schemas.openxmlformats.org/markup-compatibility/2006">
-        <mc:Choice xmlns:a14="http://schemas.microsoft.com/office/drawing/2010/main" Requires="a14">
+      <mc:AlternateContent xmlns:mc="http://schemas.openxmlformats.org/markup-compatibility/2006" xmlns:a14="http://schemas.microsoft.com/office/drawing/2010/main">
+        <mc:Choice Requires="a14">
           <p:sp>
             <p:nvSpPr>
               <p:cNvPr id="6" name="TextBox 5">
@@ -12366,7 +12372,7 @@
             </p:txBody>
           </p:sp>
         </mc:Choice>
-        <mc:Fallback>
+        <mc:Fallback xmlns="">
           <p:sp>
             <p:nvSpPr>
               <p:cNvPr id="6" name="TextBox 5">
@@ -12431,8 +12437,8 @@
             <a:chExt cx="2425570" cy="910069"/>
           </a:xfrm>
         </p:grpSpPr>
-        <mc:AlternateContent xmlns:mc="http://schemas.openxmlformats.org/markup-compatibility/2006">
-          <mc:Choice xmlns:a14="http://schemas.microsoft.com/office/drawing/2010/main" Requires="a14">
+        <mc:AlternateContent xmlns:mc="http://schemas.openxmlformats.org/markup-compatibility/2006" xmlns:a14="http://schemas.microsoft.com/office/drawing/2010/main">
+          <mc:Choice Requires="a14">
             <p:sp>
               <p:nvSpPr>
                 <p:cNvPr id="15" name="TextBox 14">
@@ -12461,6 +12467,7 @@
                 </a:bodyPr>
                 <a:lstStyle/>
                 <a:p>
+                  <a:pPr/>
                   <a14:m>
                     <m:oMathPara xmlns:m="http://schemas.openxmlformats.org/officeDocument/2006/math">
                       <m:oMathParaPr>
@@ -12470,56 +12477,76 @@
                         <m:sSub>
                           <m:sSubPr>
                             <m:ctrlPr>
-                              <a:rPr lang="ko-KR" altLang="ko-KR" sz="1600" i="1"/>
+                              <a:rPr lang="ko-KR" altLang="ko-KR" sz="1600" i="1">
+                                <a:latin typeface="Cambria Math" panose="02040503050406030204" pitchFamily="18" charset="0"/>
+                              </a:rPr>
                             </m:ctrlPr>
                           </m:sSubPr>
                           <m:e>
                             <m:r>
-                              <a:rPr lang="en-US" altLang="ko-KR" sz="1600" i="1"/>
+                              <a:rPr lang="en-US" altLang="ko-KR" sz="1600" i="1">
+                                <a:latin typeface="Cambria Math" panose="02040503050406030204" pitchFamily="18" charset="0"/>
+                              </a:rPr>
                               <m:t>𝐶</m:t>
                             </m:r>
                           </m:e>
                           <m:sub>
                             <m:r>
-                              <a:rPr lang="en-US" altLang="ko-KR" sz="1600" i="1"/>
+                              <a:rPr lang="en-US" altLang="ko-KR" sz="1600" i="1">
+                                <a:latin typeface="Cambria Math" panose="02040503050406030204" pitchFamily="18" charset="0"/>
+                              </a:rPr>
                               <m:t>𝑝</m:t>
                             </m:r>
                           </m:sub>
                         </m:sSub>
                         <m:r>
-                          <a:rPr lang="en-US" altLang="ko-KR" sz="1600" i="1"/>
+                          <a:rPr lang="en-US" altLang="ko-KR" sz="1600" i="1">
+                            <a:latin typeface="Cambria Math" panose="02040503050406030204" pitchFamily="18" charset="0"/>
+                          </a:rPr>
                           <m:t>=</m:t>
                         </m:r>
                         <m:f>
                           <m:fPr>
                             <m:ctrlPr>
-                              <a:rPr lang="ko-KR" altLang="ko-KR" sz="1600" i="1"/>
+                              <a:rPr lang="ko-KR" altLang="ko-KR" sz="1600" i="1">
+                                <a:latin typeface="Cambria Math" panose="02040503050406030204" pitchFamily="18" charset="0"/>
+                              </a:rPr>
                             </m:ctrlPr>
                           </m:fPr>
                           <m:num>
                             <m:r>
-                              <a:rPr lang="en-US" altLang="ko-KR" sz="1600" i="1"/>
+                              <a:rPr lang="en-US" altLang="ko-KR" sz="1600" i="1">
+                                <a:latin typeface="Cambria Math" panose="02040503050406030204" pitchFamily="18" charset="0"/>
+                              </a:rPr>
                               <m:t>𝑝</m:t>
                             </m:r>
                             <m:r>
-                              <a:rPr lang="en-US" altLang="ko-KR" sz="1600" i="1"/>
+                              <a:rPr lang="en-US" altLang="ko-KR" sz="1600" i="1">
+                                <a:latin typeface="Cambria Math" panose="02040503050406030204" pitchFamily="18" charset="0"/>
+                              </a:rPr>
                               <m:t>−</m:t>
                             </m:r>
                             <m:sSub>
                               <m:sSubPr>
                                 <m:ctrlPr>
-                                  <a:rPr lang="ko-KR" altLang="ko-KR" sz="1600" i="1"/>
+                                  <a:rPr lang="ko-KR" altLang="ko-KR" sz="1600" i="1">
+                                    <a:latin typeface="Cambria Math" panose="02040503050406030204" pitchFamily="18" charset="0"/>
+                                  </a:rPr>
                                 </m:ctrlPr>
                               </m:sSubPr>
                               <m:e>
                                 <m:r>
-                                  <a:rPr lang="en-US" altLang="ko-KR" sz="1600" i="1"/>
+                                  <a:rPr lang="en-US" altLang="ko-KR" sz="1600" i="1">
+                                    <a:latin typeface="Cambria Math" panose="02040503050406030204" pitchFamily="18" charset="0"/>
+                                  </a:rPr>
                                   <m:t>𝑝</m:t>
                                 </m:r>
                               </m:e>
                               <m:sub>
                                 <m:r>
-                                  <a:rPr lang="en-US" altLang="ko-KR" sz="1600" i="1"/>
+                                  <a:rPr lang="en-US" altLang="ko-KR" sz="1600" i="1">
+                                    <a:latin typeface="Cambria Math" panose="02040503050406030204" pitchFamily="18" charset="0"/>
+                                  </a:rPr>
                                   <m:t>∞</m:t>
                                 </m:r>
                               </m:sub>
@@ -12529,18 +12556,24 @@
                             <m:f>
                               <m:fPr>
                                 <m:ctrlPr>
-                                  <a:rPr lang="ko-KR" altLang="ko-KR" sz="1600" i="1"/>
+                                  <a:rPr lang="ko-KR" altLang="ko-KR" sz="1600" i="1">
+                                    <a:latin typeface="Cambria Math" panose="02040503050406030204" pitchFamily="18" charset="0"/>
+                                  </a:rPr>
                                 </m:ctrlPr>
                               </m:fPr>
                               <m:num>
                                 <m:r>
-                                  <a:rPr lang="en-US" altLang="ko-KR" sz="1600" i="1"/>
+                                  <a:rPr lang="en-US" altLang="ko-KR" sz="1600" i="1">
+                                    <a:latin typeface="Cambria Math" panose="02040503050406030204" pitchFamily="18" charset="0"/>
+                                  </a:rPr>
                                   <m:t>1</m:t>
                                 </m:r>
                               </m:num>
                               <m:den>
                                 <m:r>
-                                  <a:rPr lang="en-US" altLang="ko-KR" sz="1600" i="1"/>
+                                  <a:rPr lang="en-US" altLang="ko-KR" sz="1600" i="1">
+                                    <a:latin typeface="Cambria Math" panose="02040503050406030204" pitchFamily="18" charset="0"/>
+                                  </a:rPr>
                                   <m:t>2</m:t>
                                 </m:r>
                               </m:den>
@@ -12548,18 +12581,24 @@
                             <m:sSub>
                               <m:sSubPr>
                                 <m:ctrlPr>
-                                  <a:rPr lang="ko-KR" altLang="ko-KR" sz="1600" i="1"/>
+                                  <a:rPr lang="ko-KR" altLang="ko-KR" sz="1600" i="1">
+                                    <a:latin typeface="Cambria Math" panose="02040503050406030204" pitchFamily="18" charset="0"/>
+                                  </a:rPr>
                                 </m:ctrlPr>
                               </m:sSubPr>
                               <m:e>
                                 <m:r>
-                                  <a:rPr lang="en-US" altLang="ko-KR" sz="1600" i="1"/>
+                                  <a:rPr lang="en-US" altLang="ko-KR" sz="1600" i="1">
+                                    <a:latin typeface="Cambria Math" panose="02040503050406030204" pitchFamily="18" charset="0"/>
+                                  </a:rPr>
                                   <m:t>𝜌</m:t>
                                 </m:r>
                               </m:e>
                               <m:sub>
                                 <m:r>
-                                  <a:rPr lang="en-US" altLang="ko-KR" sz="1600" i="1"/>
+                                  <a:rPr lang="en-US" altLang="ko-KR" sz="1600" i="1">
+                                    <a:latin typeface="Cambria Math" panose="02040503050406030204" pitchFamily="18" charset="0"/>
+                                  </a:rPr>
                                   <m:t>∞</m:t>
                                 </m:r>
                               </m:sub>
@@ -12567,24 +12606,32 @@
                             <m:sSubSup>
                               <m:sSubSupPr>
                                 <m:ctrlPr>
-                                  <a:rPr lang="ko-KR" altLang="ko-KR" sz="1600" i="1"/>
+                                  <a:rPr lang="ko-KR" altLang="ko-KR" sz="1600" i="1">
+                                    <a:latin typeface="Cambria Math" panose="02040503050406030204" pitchFamily="18" charset="0"/>
+                                  </a:rPr>
                                 </m:ctrlPr>
                               </m:sSubSupPr>
                               <m:e>
                                 <m:r>
-                                  <a:rPr lang="en-US" altLang="ko-KR" sz="1600" i="1"/>
+                                  <a:rPr lang="en-US" altLang="ko-KR" sz="1600" i="1">
+                                    <a:latin typeface="Cambria Math" panose="02040503050406030204" pitchFamily="18" charset="0"/>
+                                  </a:rPr>
                                   <m:t>𝑉</m:t>
                                 </m:r>
                               </m:e>
                               <m:sub>
                                 <m:r>
-                                  <a:rPr lang="en-US" altLang="ko-KR" sz="1600" i="1"/>
+                                  <a:rPr lang="en-US" altLang="ko-KR" sz="1600" i="1">
+                                    <a:latin typeface="Cambria Math" panose="02040503050406030204" pitchFamily="18" charset="0"/>
+                                  </a:rPr>
                                   <m:t>∞</m:t>
                                 </m:r>
                               </m:sub>
                               <m:sup>
                                 <m:r>
-                                  <a:rPr lang="en-US" altLang="ko-KR" sz="1600" i="1"/>
+                                  <a:rPr lang="en-US" altLang="ko-KR" sz="1600" i="1">
+                                    <a:latin typeface="Cambria Math" panose="02040503050406030204" pitchFamily="18" charset="0"/>
+                                  </a:rPr>
                                   <m:t>2</m:t>
                                 </m:r>
                               </m:sup>
@@ -12599,7 +12646,7 @@
               </p:txBody>
             </p:sp>
           </mc:Choice>
-          <mc:Fallback>
+          <mc:Fallback xmlns="">
             <p:sp>
               <p:nvSpPr>
                 <p:cNvPr id="15" name="TextBox 14">
@@ -12698,7 +12745,7 @@
     <mc:Choice Requires="p14">
       <p:transition/>
     </mc:Choice>
-    <mc:Fallback xmlns="" xmlns:c="http://schemas.openxmlformats.org/drawingml/2006/chart" xmlns:dgm="http://schemas.openxmlformats.org/drawingml/2006/diagram" xmlns:dsp="http://schemas.microsoft.com/office/drawing/2008/diagram">
+    <mc:Fallback xmlns:dsp="http://schemas.microsoft.com/office/drawing/2008/diagram" xmlns:dgm="http://schemas.openxmlformats.org/drawingml/2006/diagram" xmlns:c="http://schemas.openxmlformats.org/drawingml/2006/chart" xmlns="">
       <p:transition/>
     </mc:Fallback>
   </mc:AlternateContent>
@@ -12788,6 +12835,67 @@
           </a:p>
         </p:txBody>
       </p:sp>
+      <p:sp>
+        <p:nvSpPr>
+          <p:cNvPr id="3" name="TextBox 2">
+            <a:extLst>
+              <a:ext uri="{FF2B5EF4-FFF2-40B4-BE49-F238E27FC236}">
+                <a16:creationId xmlns:a16="http://schemas.microsoft.com/office/drawing/2014/main" id="{A2F46CF1-6F82-5B02-CD30-C6651012E5E2}"/>
+              </a:ext>
+            </a:extLst>
+          </p:cNvPr>
+          <p:cNvSpPr txBox="1"/>
+          <p:nvPr/>
+        </p:nvSpPr>
+        <p:spPr>
+          <a:xfrm>
+            <a:off x="6372808" y="5962261"/>
+            <a:ext cx="5943599" cy="461665"/>
+          </a:xfrm>
+          <a:prstGeom prst="rect">
+            <a:avLst/>
+          </a:prstGeom>
+          <a:noFill/>
+        </p:spPr>
+        <p:txBody>
+          <a:bodyPr wrap="square" rtlCol="0">
+            <a:spAutoFit/>
+          </a:bodyPr>
+          <a:lstStyle/>
+          <a:p>
+            <a:r>
+              <a:rPr lang="ko-KR" altLang="en-US" sz="1200" dirty="0"/>
+              <a:t>자세한 사항은 </a:t>
+            </a:r>
+            <a:r>
+              <a:rPr lang="en-US" altLang="ko-KR" sz="1200" dirty="0"/>
+              <a:t>Git hub</a:t>
+            </a:r>
+            <a:r>
+              <a:rPr lang="ko-KR" altLang="en-US" sz="1200" dirty="0"/>
+              <a:t>를 참조해 주시면 감사하겠습니다</a:t>
+            </a:r>
+            <a:r>
+              <a:rPr lang="en-US" altLang="ko-KR" sz="1200" dirty="0"/>
+              <a:t>.</a:t>
+            </a:r>
+            <a:br>
+              <a:rPr lang="en-US" altLang="ko-KR" sz="1200" dirty="0"/>
+            </a:br>
+            <a:r>
+              <a:rPr lang="ko-KR" altLang="en-US" sz="1200" dirty="0"/>
+              <a:t>링크</a:t>
+            </a:r>
+            <a:r>
+              <a:rPr lang="en-US" altLang="ko-KR" sz="1200" dirty="0">
+                <a:hlinkClick r:id="rId3"/>
+              </a:rPr>
+              <a:t>: https://github.com/Bogeuns/CFD_Class_Lecture/tree/main/Lecture/Week_1</a:t>
+            </a:r>
+            <a:endParaRPr lang="ko-KR" altLang="en-US" sz="1200" dirty="0"/>
+          </a:p>
+        </p:txBody>
+      </p:sp>
     </p:spTree>
     <p:extLst>
       <p:ext uri="{BB962C8B-B14F-4D97-AF65-F5344CB8AC3E}">
@@ -12802,7 +12910,7 @@
     <mc:Choice Requires="p14">
       <p:transition/>
     </mc:Choice>
-    <mc:Fallback xmlns="" xmlns:c="http://schemas.openxmlformats.org/drawingml/2006/chart" xmlns:dgm="http://schemas.openxmlformats.org/drawingml/2006/diagram" xmlns:dsp="http://schemas.microsoft.com/office/drawing/2008/diagram">
+    <mc:Fallback xmlns:dsp="http://schemas.microsoft.com/office/drawing/2008/diagram" xmlns:dgm="http://schemas.openxmlformats.org/drawingml/2006/diagram" xmlns:c="http://schemas.openxmlformats.org/drawingml/2006/chart" xmlns="">
       <p:transition/>
     </mc:Fallback>
   </mc:AlternateContent>
@@ -13260,8 +13368,8 @@
           </a:p>
         </p:txBody>
       </p:sp>
-      <mc:AlternateContent xmlns:mc="http://schemas.openxmlformats.org/markup-compatibility/2006">
-        <mc:Choice xmlns:a14="http://schemas.microsoft.com/office/drawing/2010/main" Requires="a14">
+      <mc:AlternateContent xmlns:mc="http://schemas.openxmlformats.org/markup-compatibility/2006" xmlns:a14="http://schemas.microsoft.com/office/drawing/2010/main">
+        <mc:Choice Requires="a14">
           <p:sp>
             <p:nvSpPr>
               <p:cNvPr id="4" name="TextBox 3">
@@ -13437,7 +13545,7 @@
             </p:txBody>
           </p:sp>
         </mc:Choice>
-        <mc:Fallback>
+        <mc:Fallback xmlns="">
           <p:sp>
             <p:nvSpPr>
               <p:cNvPr id="4" name="TextBox 3">
@@ -13496,7 +13604,7 @@
     <mc:Choice Requires="p14">
       <p:transition/>
     </mc:Choice>
-    <mc:Fallback xmlns="" xmlns:c="http://schemas.openxmlformats.org/drawingml/2006/chart" xmlns:dgm="http://schemas.openxmlformats.org/drawingml/2006/diagram" xmlns:dsp="http://schemas.microsoft.com/office/drawing/2008/diagram">
+    <mc:Fallback xmlns:dsp="http://schemas.microsoft.com/office/drawing/2008/diagram" xmlns:dgm="http://schemas.openxmlformats.org/drawingml/2006/diagram" xmlns:c="http://schemas.openxmlformats.org/drawingml/2006/chart" xmlns="">
       <p:transition/>
     </mc:Fallback>
   </mc:AlternateContent>
@@ -15186,7 +15294,7 @@
     <mc:Choice Requires="p14">
       <p:transition/>
     </mc:Choice>
-    <mc:Fallback xmlns="" xmlns:c="http://schemas.openxmlformats.org/drawingml/2006/chart" xmlns:dgm="http://schemas.openxmlformats.org/drawingml/2006/diagram" xmlns:dsp="http://schemas.microsoft.com/office/drawing/2008/diagram">
+    <mc:Fallback xmlns:dsp="http://schemas.microsoft.com/office/drawing/2008/diagram" xmlns:dgm="http://schemas.openxmlformats.org/drawingml/2006/diagram" xmlns:c="http://schemas.openxmlformats.org/drawingml/2006/chart" xmlns="">
       <p:transition/>
     </mc:Fallback>
   </mc:AlternateContent>
@@ -16321,7 +16429,7 @@
     <mc:Choice Requires="p14">
       <p:transition/>
     </mc:Choice>
-    <mc:Fallback xmlns="" xmlns:c="http://schemas.openxmlformats.org/drawingml/2006/chart" xmlns:dgm="http://schemas.openxmlformats.org/drawingml/2006/diagram" xmlns:dsp="http://schemas.microsoft.com/office/drawing/2008/diagram">
+    <mc:Fallback xmlns:dsp="http://schemas.microsoft.com/office/drawing/2008/diagram" xmlns:dgm="http://schemas.openxmlformats.org/drawingml/2006/diagram" xmlns:c="http://schemas.openxmlformats.org/drawingml/2006/chart" xmlns="">
       <p:transition/>
     </mc:Fallback>
   </mc:AlternateContent>
@@ -17528,7 +17636,7 @@
     <mc:Choice Requires="p14">
       <p:transition/>
     </mc:Choice>
-    <mc:Fallback xmlns="" xmlns:c="http://schemas.openxmlformats.org/drawingml/2006/chart" xmlns:dgm="http://schemas.openxmlformats.org/drawingml/2006/diagram" xmlns:dsp="http://schemas.microsoft.com/office/drawing/2008/diagram">
+    <mc:Fallback xmlns:dsp="http://schemas.microsoft.com/office/drawing/2008/diagram" xmlns:dgm="http://schemas.openxmlformats.org/drawingml/2006/diagram" xmlns:c="http://schemas.openxmlformats.org/drawingml/2006/chart" xmlns="">
       <p:transition/>
     </mc:Fallback>
   </mc:AlternateContent>
@@ -18552,7 +18660,7 @@
     <mc:Choice Requires="p14">
       <p:transition/>
     </mc:Choice>
-    <mc:Fallback xmlns="" xmlns:c="http://schemas.openxmlformats.org/drawingml/2006/chart" xmlns:dgm="http://schemas.openxmlformats.org/drawingml/2006/diagram" xmlns:dsp="http://schemas.microsoft.com/office/drawing/2008/diagram">
+    <mc:Fallback xmlns:dsp="http://schemas.microsoft.com/office/drawing/2008/diagram" xmlns:dgm="http://schemas.openxmlformats.org/drawingml/2006/diagram" xmlns:c="http://schemas.openxmlformats.org/drawingml/2006/chart" xmlns="">
       <p:transition/>
     </mc:Fallback>
   </mc:AlternateContent>
@@ -19579,7 +19687,7 @@
     <mc:Choice Requires="p14">
       <p:transition/>
     </mc:Choice>
-    <mc:Fallback xmlns="" xmlns:c="http://schemas.openxmlformats.org/drawingml/2006/chart" xmlns:dgm="http://schemas.openxmlformats.org/drawingml/2006/diagram" xmlns:dsp="http://schemas.microsoft.com/office/drawing/2008/diagram">
+    <mc:Fallback xmlns:dsp="http://schemas.microsoft.com/office/drawing/2008/diagram" xmlns:dgm="http://schemas.openxmlformats.org/drawingml/2006/diagram" xmlns:c="http://schemas.openxmlformats.org/drawingml/2006/chart" xmlns="">
       <p:transition/>
     </mc:Fallback>
   </mc:AlternateContent>
@@ -21271,7 +21379,7 @@
     <mc:Choice Requires="p14">
       <p:transition/>
     </mc:Choice>
-    <mc:Fallback xmlns="" xmlns:c="http://schemas.openxmlformats.org/drawingml/2006/chart" xmlns:dgm="http://schemas.openxmlformats.org/drawingml/2006/diagram" xmlns:dsp="http://schemas.microsoft.com/office/drawing/2008/diagram">
+    <mc:Fallback xmlns:dsp="http://schemas.microsoft.com/office/drawing/2008/diagram" xmlns:dgm="http://schemas.openxmlformats.org/drawingml/2006/diagram" xmlns:c="http://schemas.openxmlformats.org/drawingml/2006/chart" xmlns="">
       <p:transition/>
     </mc:Fallback>
   </mc:AlternateContent>
@@ -23180,8 +23288,8 @@
             </a:p>
           </p:txBody>
         </p:sp>
-        <mc:AlternateContent xmlns:mc="http://schemas.openxmlformats.org/markup-compatibility/2006">
-          <mc:Choice xmlns:a14="http://schemas.microsoft.com/office/drawing/2010/main" Requires="a14">
+        <mc:AlternateContent xmlns:mc="http://schemas.openxmlformats.org/markup-compatibility/2006" xmlns:a14="http://schemas.microsoft.com/office/drawing/2010/main">
+          <mc:Choice Requires="a14">
             <p:sp>
               <p:nvSpPr>
                 <p:cNvPr id="14" name="TextBox 13">
@@ -23367,7 +23475,7 @@
               </p:txBody>
             </p:sp>
           </mc:Choice>
-          <mc:Fallback>
+          <mc:Fallback xmlns="">
             <p:sp>
               <p:nvSpPr>
                 <p:cNvPr id="14" name="TextBox 13">
@@ -23427,7 +23535,7 @@
     <mc:Choice Requires="p14">
       <p:transition/>
     </mc:Choice>
-    <mc:Fallback xmlns="" xmlns:c="http://schemas.openxmlformats.org/drawingml/2006/chart" xmlns:dgm="http://schemas.openxmlformats.org/drawingml/2006/diagram" xmlns:dsp="http://schemas.microsoft.com/office/drawing/2008/diagram">
+    <mc:Fallback xmlns:dsp="http://schemas.microsoft.com/office/drawing/2008/diagram" xmlns:dgm="http://schemas.openxmlformats.org/drawingml/2006/diagram" xmlns:c="http://schemas.openxmlformats.org/drawingml/2006/chart" xmlns="">
       <p:transition/>
     </mc:Fallback>
   </mc:AlternateContent>

</xml_diff>